<commit_message>
[ci] deploy site b4ef9546fe54e13c3b041781320bca63ec9f8aa0
</commit_message>
<xml_diff>
--- a/images/test.pptx
+++ b/images/test.pptx
@@ -6,6 +6,7 @@
   </p:sldMasterIdLst>
   <p:sldIdLst>
     <p:sldId id="256" r:id="rId3"/>
+    <p:sldId id="257" r:id="rId4"/>
   </p:sldIdLst>
   <p:sldSz cx="12192000" cy="6858000"/>
   <p:notesSz cx="6858000" cy="9144000"/>
@@ -3159,6 +3160,48 @@
 </p:sld>
 </file>
 
+<file path=ppt/slides/slide2.xml><?xml version="1.0" encoding="utf-8"?>
+<p:sld xmlns:a="http://schemas.openxmlformats.org/drawingml/2006/main" xmlns:r="http://schemas.openxmlformats.org/officeDocument/2006/relationships" xmlns:p="http://schemas.openxmlformats.org/presentationml/2006/main">
+  <p:cSld>
+    <p:spTree>
+      <p:nvGrpSpPr>
+        <p:cNvPr id="1" name=""/>
+        <p:cNvGrpSpPr/>
+        <p:nvPr/>
+      </p:nvGrpSpPr>
+      <p:grpSpPr/>
+      <p:pic>
+        <p:nvPicPr>
+          <p:cNvPr id="4" name="Picture 3" descr="deep_learning"/>
+          <p:cNvPicPr>
+            <a:picLocks noChangeAspect="1"/>
+          </p:cNvPicPr>
+          <p:nvPr/>
+        </p:nvPicPr>
+        <p:blipFill>
+          <a:blip r:embed="rId1"/>
+          <a:stretch>
+            <a:fillRect/>
+          </a:stretch>
+        </p:blipFill>
+        <p:spPr>
+          <a:xfrm>
+            <a:off x="2591435" y="1433195"/>
+            <a:ext cx="6369050" cy="3307715"/>
+          </a:xfrm>
+          <a:prstGeom prst="rect">
+            <a:avLst/>
+          </a:prstGeom>
+        </p:spPr>
+      </p:pic>
+    </p:spTree>
+  </p:cSld>
+  <p:clrMapOvr>
+    <a:masterClrMapping/>
+  </p:clrMapOvr>
+</p:sld>
+</file>
+
 <file path=ppt/theme/theme1.xml><?xml version="1.0" encoding="utf-8"?>
 <a:theme xmlns:a="http://schemas.openxmlformats.org/drawingml/2006/main" name="Office Theme">
   <a:themeElements>

</xml_diff>